<commit_message>
Flat and CSV Refs don't use commas
Updating the presentations to conform with the format as specified in the CNA Rules.  Multiple references in the Flat and CSV formats are separated by just a space, not a comma and a space.
</commit_message>
<xml_diff>
--- a/docs/cna/Entry_Submission_Process.pptx
+++ b/docs/cna/Entry_Submission_Process.pptx
@@ -5679,7 +5679,7 @@
             <a:pPr lvl="1"/>
             <a:r>
               <a:rPr lang="en-US" dirty="0"/>
-              <a:t>Separate references by a comma followed by a space; eg,</a:t>
+              <a:t>Separate references by a space; eg,</a:t>
             </a:r>
             <a:endParaRPr lang="en-US" sz="1600" dirty="0">
               <a:latin typeface="Courier New" panose="02070309020205020404" pitchFamily="49" charset="0"/>
@@ -5695,7 +5695,63 @@
                 <a:latin typeface="Courier New" panose="02070309020205020404" pitchFamily="49" charset="0"/>
                 <a:cs typeface="Courier New" panose="02070309020205020404" pitchFamily="49" charset="0"/>
               </a:rPr>
-              <a:t>CVE-2016-6816,…,”https://tomcat.apache.org/security-9.html#Fixed_in_Apache_Tomcat_9.0.0.M13, https://tomcat.apache.org/security-8.html#Fixed_in_Apache_Tomcat_8.5.8, https://tomcat.apache.org/security-8.html#Fixed_in_Apache_Tomcat_8.0.39, https://tomcat.apache.org/security-7.html#Fixed_in_Apache_Tomcat_7.0.73, https://tomcat.apache.org/security-6.html#Fixed_in_Apache_Tomcat_6.0.48”,…</a:t>
+              <a:t>CVE-2016-6816,…,”https://tomcat.apache.org/security-9.html#Fixed_in_Apache_Tomcat_9.0.0</a:t>
+            </a:r>
+            <a:r>
+              <a:rPr lang="en-US" sz="1600">
+                <a:latin typeface="Courier New" panose="02070309020205020404" pitchFamily="49" charset="0"/>
+                <a:cs typeface="Courier New" panose="02070309020205020404" pitchFamily="49" charset="0"/>
+              </a:rPr>
+              <a:t>.M13 </a:t>
+            </a:r>
+            <a:r>
+              <a:rPr lang="en-US" sz="1600" dirty="0">
+                <a:latin typeface="Courier New" panose="02070309020205020404" pitchFamily="49" charset="0"/>
+                <a:cs typeface="Courier New" panose="02070309020205020404" pitchFamily="49" charset="0"/>
+              </a:rPr>
+              <a:t>https://tomcat.apache.org/security-8.html#Fixed_in_Apache_Tomcat</a:t>
+            </a:r>
+            <a:r>
+              <a:rPr lang="en-US" sz="1600">
+                <a:latin typeface="Courier New" panose="02070309020205020404" pitchFamily="49" charset="0"/>
+                <a:cs typeface="Courier New" panose="02070309020205020404" pitchFamily="49" charset="0"/>
+              </a:rPr>
+              <a:t>_8.5.8 </a:t>
+            </a:r>
+            <a:r>
+              <a:rPr lang="en-US" sz="1600" dirty="0">
+                <a:latin typeface="Courier New" panose="02070309020205020404" pitchFamily="49" charset="0"/>
+                <a:cs typeface="Courier New" panose="02070309020205020404" pitchFamily="49" charset="0"/>
+              </a:rPr>
+              <a:t>https://tomcat.apache.org/security-8.html#Fixed_in_Apache_Tomcat</a:t>
+            </a:r>
+            <a:r>
+              <a:rPr lang="en-US" sz="1600">
+                <a:latin typeface="Courier New" panose="02070309020205020404" pitchFamily="49" charset="0"/>
+                <a:cs typeface="Courier New" panose="02070309020205020404" pitchFamily="49" charset="0"/>
+              </a:rPr>
+              <a:t>_8.0.39 </a:t>
+            </a:r>
+            <a:r>
+              <a:rPr lang="en-US" sz="1600" dirty="0">
+                <a:latin typeface="Courier New" panose="02070309020205020404" pitchFamily="49" charset="0"/>
+                <a:cs typeface="Courier New" panose="02070309020205020404" pitchFamily="49" charset="0"/>
+              </a:rPr>
+              <a:t>https://tomcat.apache.org/security-7.html#Fixed_in_Apache_Tomcat</a:t>
+            </a:r>
+            <a:r>
+              <a:rPr lang="en-US" sz="1600">
+                <a:latin typeface="Courier New" panose="02070309020205020404" pitchFamily="49" charset="0"/>
+                <a:cs typeface="Courier New" panose="02070309020205020404" pitchFamily="49" charset="0"/>
+              </a:rPr>
+              <a:t>_7.0.73 </a:t>
+            </a:r>
+            <a:r>
+              <a:rPr lang="en-US" sz="1600" dirty="0">
+                <a:latin typeface="Courier New" panose="02070309020205020404" pitchFamily="49" charset="0"/>
+                <a:cs typeface="Courier New" panose="02070309020205020404" pitchFamily="49" charset="0"/>
+              </a:rPr>
+              <a:t>https://tomcat.apache.org/security-6.html#Fixed_in_Apache_Tomcat_6.0.48”,…</a:t>
             </a:r>
           </a:p>
           <a:p>
@@ -9425,7 +9481,7 @@
             <a:pPr lvl="1"/>
             <a:r>
               <a:rPr lang="en-US" dirty="0"/>
-              <a:t>Separate references by a comma followed by a space; eg,</a:t>
+              <a:t>Separate references by a space; eg,</a:t>
             </a:r>
             <a:endParaRPr lang="en-US" sz="1600" dirty="0">
               <a:latin typeface="Courier New" panose="02070309020205020404" pitchFamily="49" charset="0"/>
@@ -9441,7 +9497,7 @@
                 <a:latin typeface="Courier New" panose="02070309020205020404" pitchFamily="49" charset="0"/>
                 <a:cs typeface="Courier New" panose="02070309020205020404" pitchFamily="49" charset="0"/>
               </a:rPr>
-              <a:t>[REFERENCES]: https://tomcat.apache.org/security-9.html#Fixed_in_Apache_Tomcat_9.0.0.M13, https://tomcat.apache.org/security-8.html#Fixed_in_Apache_Tomcat_8.5.8, https://tomcat.apache.org/security-8.html#Fixed_in_Apache_Tomcat_8.0.39, https://tomcat.apache.org/security-7.html#Fixed_in_Apache_Tomcat_7.0.73, https://tomcat.apache.org/security-6.html#Fixed_in_Apache_Tomcat_6.0.48</a:t>
+              <a:t>[REFERENCES]: https://tomcat.apache.org/security-9.html#Fixed_in_Apache_Tomcat_9.0.0.M13 https://tomcat.apache.org/security-8.html#Fixed_in_Apache_Tomcat_8.5.8 https://tomcat.apache.org/security-8.html#Fixed_in_Apache_Tomcat_8.0.39 https://tomcat.apache.org/security-7.html#Fixed_in_Apache_Tomcat_7.0.73 https://tomcat.apache.org/security-6.html#Fixed_in_Apache_Tomcat_6.0.48</a:t>
             </a:r>
           </a:p>
           <a:p>
@@ -9920,11 +9976,12 @@
 
 <file path=customXml/item2.xml><?xml version="1.0" encoding="utf-8"?>
 <?mso-contentType ?>
-<FormTemplates xmlns="http://schemas.microsoft.com/sharepoint/v3/contenttype/forms">
-  <Display>DocumentLibraryForm</Display>
-  <Edit>DocumentLibraryForm</Edit>
-  <New>DocumentLibraryForm</New>
-</FormTemplates>
+<customXsn xmlns="http://schemas.microsoft.com/office/2006/metadata/customXsn">
+  <xsnLocation/>
+  <cached>True</cached>
+  <openByDefault>True</openByDefault>
+  <xsnScope/>
+</customXsn>
 </file>
 
 <file path=customXml/item3.xml><?xml version="1.0" encoding="utf-8"?>
@@ -10093,12 +10150,11 @@
 
 <file path=customXml/item4.xml><?xml version="1.0" encoding="utf-8"?>
 <?mso-contentType ?>
-<customXsn xmlns="http://schemas.microsoft.com/office/2006/metadata/customXsn">
-  <xsnLocation/>
-  <cached>True</cached>
-  <openByDefault>True</openByDefault>
-  <xsnScope/>
-</customXsn>
+<FormTemplates xmlns="http://schemas.microsoft.com/sharepoint/v3/contenttype/forms">
+  <Display>DocumentLibraryForm</Display>
+  <Edit>DocumentLibraryForm</Edit>
+  <New>DocumentLibraryForm</New>
+</FormTemplates>
 </file>
 
 <file path=customXml/itemProps1.xml><?xml version="1.0" encoding="utf-8"?>
@@ -10113,9 +10169,9 @@
 </file>
 
 <file path=customXml/itemProps2.xml><?xml version="1.0" encoding="utf-8"?>
-<ds:datastoreItem xmlns:ds="http://schemas.openxmlformats.org/officeDocument/2006/customXml" ds:itemID="{8AC27AC7-872E-4360-A0DE-98010D1A6FE4}">
+<ds:datastoreItem xmlns:ds="http://schemas.openxmlformats.org/officeDocument/2006/customXml" ds:itemID="{5BF83DD6-6F2D-4879-B4F4-F587C09B869A}">
   <ds:schemaRefs>
-    <ds:schemaRef ds:uri="http://schemas.microsoft.com/sharepoint/v3/contenttype/forms"/>
+    <ds:schemaRef ds:uri="http://schemas.microsoft.com/office/2006/metadata/customXsn"/>
   </ds:schemaRefs>
 </ds:datastoreItem>
 </file>
@@ -10140,9 +10196,9 @@
 </file>
 
 <file path=customXml/itemProps4.xml><?xml version="1.0" encoding="utf-8"?>
-<ds:datastoreItem xmlns:ds="http://schemas.openxmlformats.org/officeDocument/2006/customXml" ds:itemID="{5BF83DD6-6F2D-4879-B4F4-F587C09B869A}">
+<ds:datastoreItem xmlns:ds="http://schemas.openxmlformats.org/officeDocument/2006/customXml" ds:itemID="{8AC27AC7-872E-4360-A0DE-98010D1A6FE4}">
   <ds:schemaRefs>
-    <ds:schemaRef ds:uri="http://schemas.microsoft.com/office/2006/metadata/customXsn"/>
+    <ds:schemaRef ds:uri="http://schemas.microsoft.com/sharepoint/v3/contenttype/forms"/>
   </ds:schemaRefs>
 </ds:datastoreItem>
 </file>
</xml_diff>

<commit_message>
Added additional guidance on how to use Vulnogram
</commit_message>
<xml_diff>
--- a/docs/cna/Entry_Submission_Process.pptx
+++ b/docs/cna/Entry_Submission_Process.pptx
@@ -181,10 +181,6 @@
     </p:ext>
   </p:extLst>
 </p:presentation>
-</file>
-
-<file path=ppt/revisionInfo.xml><?xml version="1.0" encoding="utf-8"?>
-<p1510:revInfo xmlns:a="http://schemas.openxmlformats.org/drawingml/2006/main" xmlns:r="http://schemas.openxmlformats.org/officeDocument/2006/relationships" xmlns:p1510="http://schemas.microsoft.com/office/powerpoint/2015/10/main"/>
 </file>
 
 <file path=ppt/slideLayouts/slideLayout1.xml><?xml version="1.0" encoding="utf-8"?>
@@ -5542,7 +5538,7 @@
         <p:spPr/>
         <p:txBody>
           <a:bodyPr>
-            <a:normAutofit fontScale="92500" lnSpcReduction="10000"/>
+            <a:normAutofit fontScale="92500" lnSpcReduction="20000"/>
           </a:bodyPr>
           <a:lstStyle/>
           <a:p>
@@ -5625,6 +5621,13 @@
             <a:r>
               <a:rPr lang="en-US" dirty="0"/>
               <a:t>Write any double-quote characters in a field as two double-quote characters.</a:t>
+            </a:r>
+          </a:p>
+          <a:p>
+            <a:pPr marL="346075" indent="-342900"/>
+            <a:r>
+              <a:rPr lang="en-US" dirty="0"/>
+              <a:t>On CVE ID per line</a:t>
             </a:r>
           </a:p>
         </p:txBody>
@@ -12318,10 +12321,10 @@
       </p:sp>
       <p:pic>
         <p:nvPicPr>
-          <p:cNvPr id="8" name="Content Placeholder 7">
+          <p:cNvPr id="6" name="Content Placeholder 5">
             <a:extLst>
               <a:ext uri="{FF2B5EF4-FFF2-40B4-BE49-F238E27FC236}">
-                <a16:creationId xmlns:a16="http://schemas.microsoft.com/office/drawing/2014/main" id="{878BE8E8-36C9-4054-9F53-305D12FC0352}"/>
+                <a16:creationId xmlns:a16="http://schemas.microsoft.com/office/drawing/2014/main" id="{25FCBEBF-68A9-4E0C-AF40-8D3BCBB8C34A}"/>
               </a:ext>
             </a:extLst>
           </p:cNvPr>
@@ -12332,21 +12335,482 @@
             <p:ph idx="1"/>
           </p:nvPr>
         </p:nvPicPr>
-        <p:blipFill rotWithShape="1">
+        <p:blipFill>
           <a:blip r:embed="rId2"/>
-          <a:srcRect l="3009" t="35825" b="29257"/>
-          <a:stretch/>
+          <a:stretch>
+            <a:fillRect/>
+          </a:stretch>
         </p:blipFill>
         <p:spPr>
           <a:xfrm>
-            <a:off x="609600" y="2187020"/>
-            <a:ext cx="8011017" cy="2526382"/>
+            <a:off x="762407" y="2497357"/>
+            <a:ext cx="7918252" cy="2502660"/>
           </a:xfrm>
           <a:prstGeom prst="rect">
             <a:avLst/>
           </a:prstGeom>
         </p:spPr>
       </p:pic>
+      <p:sp>
+        <p:nvSpPr>
+          <p:cNvPr id="9" name="Rectangle: Rounded Corners 8">
+            <a:extLst>
+              <a:ext uri="{FF2B5EF4-FFF2-40B4-BE49-F238E27FC236}">
+                <a16:creationId xmlns:a16="http://schemas.microsoft.com/office/drawing/2014/main" id="{667F6824-4B78-4AF1-8FFB-4508FAE84BF3}"/>
+              </a:ext>
+            </a:extLst>
+          </p:cNvPr>
+          <p:cNvSpPr/>
+          <p:nvPr/>
+        </p:nvSpPr>
+        <p:spPr>
+          <a:xfrm>
+            <a:off x="2593960" y="2907667"/>
+            <a:ext cx="285428" cy="156546"/>
+          </a:xfrm>
+          <a:prstGeom prst="roundRect">
+            <a:avLst/>
+          </a:prstGeom>
+          <a:noFill/>
+          <a:ln>
+            <a:solidFill>
+              <a:srgbClr val="FF0000"/>
+            </a:solidFill>
+          </a:ln>
+        </p:spPr>
+        <p:style>
+          <a:lnRef idx="2">
+            <a:schemeClr val="accent5"/>
+          </a:lnRef>
+          <a:fillRef idx="1">
+            <a:schemeClr val="lt1"/>
+          </a:fillRef>
+          <a:effectRef idx="0">
+            <a:schemeClr val="accent5"/>
+          </a:effectRef>
+          <a:fontRef idx="minor">
+            <a:schemeClr val="dk1"/>
+          </a:fontRef>
+        </p:style>
+        <p:txBody>
+          <a:bodyPr rtlCol="0" anchor="ctr"/>
+          <a:lstStyle/>
+          <a:p>
+            <a:pPr algn="ctr"/>
+            <a:endParaRPr lang="en-US">
+              <a:solidFill>
+                <a:schemeClr val="tx1"/>
+              </a:solidFill>
+            </a:endParaRPr>
+          </a:p>
+        </p:txBody>
+      </p:sp>
+      <p:sp>
+        <p:nvSpPr>
+          <p:cNvPr id="10" name="Rectangle: Rounded Corners 9">
+            <a:extLst>
+              <a:ext uri="{FF2B5EF4-FFF2-40B4-BE49-F238E27FC236}">
+                <a16:creationId xmlns:a16="http://schemas.microsoft.com/office/drawing/2014/main" id="{5235EB64-31FF-4294-B506-A9E78C2A2B5F}"/>
+              </a:ext>
+            </a:extLst>
+          </p:cNvPr>
+          <p:cNvSpPr/>
+          <p:nvPr/>
+        </p:nvSpPr>
+        <p:spPr>
+          <a:xfrm>
+            <a:off x="827258" y="2891454"/>
+            <a:ext cx="670801" cy="172759"/>
+          </a:xfrm>
+          <a:prstGeom prst="roundRect">
+            <a:avLst/>
+          </a:prstGeom>
+          <a:noFill/>
+          <a:ln>
+            <a:solidFill>
+              <a:srgbClr val="FF0000"/>
+            </a:solidFill>
+          </a:ln>
+        </p:spPr>
+        <p:style>
+          <a:lnRef idx="2">
+            <a:schemeClr val="accent5"/>
+          </a:lnRef>
+          <a:fillRef idx="1">
+            <a:schemeClr val="lt1"/>
+          </a:fillRef>
+          <a:effectRef idx="0">
+            <a:schemeClr val="accent5"/>
+          </a:effectRef>
+          <a:fontRef idx="minor">
+            <a:schemeClr val="dk1"/>
+          </a:fontRef>
+        </p:style>
+        <p:txBody>
+          <a:bodyPr rtlCol="0" anchor="ctr"/>
+          <a:lstStyle/>
+          <a:p>
+            <a:pPr algn="ctr"/>
+            <a:endParaRPr lang="en-US">
+              <a:solidFill>
+                <a:schemeClr val="tx1"/>
+              </a:solidFill>
+            </a:endParaRPr>
+          </a:p>
+        </p:txBody>
+      </p:sp>
+      <p:sp>
+        <p:nvSpPr>
+          <p:cNvPr id="11" name="Rectangle: Rounded Corners 10">
+            <a:extLst>
+              <a:ext uri="{FF2B5EF4-FFF2-40B4-BE49-F238E27FC236}">
+                <a16:creationId xmlns:a16="http://schemas.microsoft.com/office/drawing/2014/main" id="{4898C11F-9523-49F2-86FE-B7E15EBC3E43}"/>
+              </a:ext>
+            </a:extLst>
+          </p:cNvPr>
+          <p:cNvSpPr/>
+          <p:nvPr/>
+        </p:nvSpPr>
+        <p:spPr>
+          <a:xfrm>
+            <a:off x="5979186" y="2907667"/>
+            <a:ext cx="421614" cy="156546"/>
+          </a:xfrm>
+          <a:prstGeom prst="roundRect">
+            <a:avLst/>
+          </a:prstGeom>
+          <a:noFill/>
+          <a:ln>
+            <a:solidFill>
+              <a:srgbClr val="FF0000"/>
+            </a:solidFill>
+          </a:ln>
+        </p:spPr>
+        <p:style>
+          <a:lnRef idx="2">
+            <a:schemeClr val="accent5"/>
+          </a:lnRef>
+          <a:fillRef idx="1">
+            <a:schemeClr val="lt1"/>
+          </a:fillRef>
+          <a:effectRef idx="0">
+            <a:schemeClr val="accent5"/>
+          </a:effectRef>
+          <a:fontRef idx="minor">
+            <a:schemeClr val="dk1"/>
+          </a:fontRef>
+        </p:style>
+        <p:txBody>
+          <a:bodyPr rtlCol="0" anchor="ctr"/>
+          <a:lstStyle/>
+          <a:p>
+            <a:pPr algn="ctr"/>
+            <a:endParaRPr lang="en-US">
+              <a:solidFill>
+                <a:schemeClr val="tx1"/>
+              </a:solidFill>
+            </a:endParaRPr>
+          </a:p>
+        </p:txBody>
+      </p:sp>
+      <p:sp>
+        <p:nvSpPr>
+          <p:cNvPr id="13" name="TextBox 12">
+            <a:extLst>
+              <a:ext uri="{FF2B5EF4-FFF2-40B4-BE49-F238E27FC236}">
+                <a16:creationId xmlns:a16="http://schemas.microsoft.com/office/drawing/2014/main" id="{8F741B16-2368-4F95-A41D-9CE47138A5E6}"/>
+              </a:ext>
+            </a:extLst>
+          </p:cNvPr>
+          <p:cNvSpPr txBox="1"/>
+          <p:nvPr/>
+        </p:nvSpPr>
+        <p:spPr>
+          <a:xfrm>
+            <a:off x="3431356" y="1853880"/>
+            <a:ext cx="1140644" cy="338554"/>
+          </a:xfrm>
+          <a:prstGeom prst="rect">
+            <a:avLst/>
+          </a:prstGeom>
+          <a:noFill/>
+        </p:spPr>
+        <p:txBody>
+          <a:bodyPr wrap="square" rtlCol="0">
+            <a:spAutoFit/>
+          </a:bodyPr>
+          <a:lstStyle/>
+          <a:p>
+            <a:pPr>
+              <a:spcAft>
+                <a:spcPts val="600"/>
+              </a:spcAft>
+            </a:pPr>
+            <a:r>
+              <a:rPr lang="en-US" sz="1600" dirty="0">
+                <a:solidFill>
+                  <a:srgbClr val="FF0000"/>
+                </a:solidFill>
+                <a:ea typeface="Verdana" pitchFamily="34" charset="0"/>
+                <a:cs typeface="Verdana" pitchFamily="34" charset="0"/>
+              </a:rPr>
+              <a:t>Required</a:t>
+            </a:r>
+          </a:p>
+        </p:txBody>
+      </p:sp>
+      <p:cxnSp>
+        <p:nvCxnSpPr>
+          <p:cNvPr id="15" name="Straight Arrow Connector 14">
+            <a:extLst>
+              <a:ext uri="{FF2B5EF4-FFF2-40B4-BE49-F238E27FC236}">
+                <a16:creationId xmlns:a16="http://schemas.microsoft.com/office/drawing/2014/main" id="{8EF5BD59-37BE-47F5-BE51-F6F81D846FCE}"/>
+              </a:ext>
+            </a:extLst>
+          </p:cNvPr>
+          <p:cNvCxnSpPr>
+            <a:cxnSpLocks/>
+            <a:stCxn id="13" idx="2"/>
+          </p:cNvCxnSpPr>
+          <p:nvPr/>
+        </p:nvCxnSpPr>
+        <p:spPr>
+          <a:xfrm flipH="1">
+            <a:off x="1498059" y="2192434"/>
+            <a:ext cx="2503619" cy="793506"/>
+          </a:xfrm>
+          <a:prstGeom prst="straightConnector1">
+            <a:avLst/>
+          </a:prstGeom>
+          <a:ln>
+            <a:solidFill>
+              <a:srgbClr val="FF0000"/>
+            </a:solidFill>
+            <a:tailEnd type="triangle"/>
+          </a:ln>
+        </p:spPr>
+        <p:style>
+          <a:lnRef idx="1">
+            <a:schemeClr val="accent1"/>
+          </a:lnRef>
+          <a:fillRef idx="0">
+            <a:schemeClr val="accent1"/>
+          </a:fillRef>
+          <a:effectRef idx="0">
+            <a:schemeClr val="accent1"/>
+          </a:effectRef>
+          <a:fontRef idx="minor">
+            <a:schemeClr val="tx1"/>
+          </a:fontRef>
+        </p:style>
+      </p:cxnSp>
+      <p:cxnSp>
+        <p:nvCxnSpPr>
+          <p:cNvPr id="18" name="Straight Arrow Connector 17">
+            <a:extLst>
+              <a:ext uri="{FF2B5EF4-FFF2-40B4-BE49-F238E27FC236}">
+                <a16:creationId xmlns:a16="http://schemas.microsoft.com/office/drawing/2014/main" id="{54BBDF27-2DA9-42F9-B537-735CAA7924AE}"/>
+              </a:ext>
+            </a:extLst>
+          </p:cNvPr>
+          <p:cNvCxnSpPr>
+            <a:cxnSpLocks/>
+            <a:stCxn id="13" idx="2"/>
+            <a:endCxn id="9" idx="0"/>
+          </p:cNvCxnSpPr>
+          <p:nvPr/>
+        </p:nvCxnSpPr>
+        <p:spPr>
+          <a:xfrm flipH="1">
+            <a:off x="2736674" y="2192434"/>
+            <a:ext cx="1265004" cy="715233"/>
+          </a:xfrm>
+          <a:prstGeom prst="straightConnector1">
+            <a:avLst/>
+          </a:prstGeom>
+          <a:ln>
+            <a:solidFill>
+              <a:srgbClr val="FF0000"/>
+            </a:solidFill>
+            <a:tailEnd type="triangle"/>
+          </a:ln>
+        </p:spPr>
+        <p:style>
+          <a:lnRef idx="1">
+            <a:schemeClr val="accent1"/>
+          </a:lnRef>
+          <a:fillRef idx="0">
+            <a:schemeClr val="accent1"/>
+          </a:fillRef>
+          <a:effectRef idx="0">
+            <a:schemeClr val="accent1"/>
+          </a:effectRef>
+          <a:fontRef idx="minor">
+            <a:schemeClr val="tx1"/>
+          </a:fontRef>
+        </p:style>
+      </p:cxnSp>
+      <p:cxnSp>
+        <p:nvCxnSpPr>
+          <p:cNvPr id="20" name="Straight Arrow Connector 19">
+            <a:extLst>
+              <a:ext uri="{FF2B5EF4-FFF2-40B4-BE49-F238E27FC236}">
+                <a16:creationId xmlns:a16="http://schemas.microsoft.com/office/drawing/2014/main" id="{BA2F0971-68B6-4495-BF9B-2C26559DADC1}"/>
+              </a:ext>
+            </a:extLst>
+          </p:cNvPr>
+          <p:cNvCxnSpPr>
+            <a:stCxn id="13" idx="2"/>
+            <a:endCxn id="11" idx="0"/>
+          </p:cNvCxnSpPr>
+          <p:nvPr/>
+        </p:nvCxnSpPr>
+        <p:spPr>
+          <a:xfrm>
+            <a:off x="4001678" y="2192434"/>
+            <a:ext cx="2188315" cy="715233"/>
+          </a:xfrm>
+          <a:prstGeom prst="straightConnector1">
+            <a:avLst/>
+          </a:prstGeom>
+          <a:ln>
+            <a:solidFill>
+              <a:srgbClr val="FF0000"/>
+            </a:solidFill>
+            <a:tailEnd type="triangle"/>
+          </a:ln>
+        </p:spPr>
+        <p:style>
+          <a:lnRef idx="1">
+            <a:schemeClr val="accent1"/>
+          </a:lnRef>
+          <a:fillRef idx="0">
+            <a:schemeClr val="accent1"/>
+          </a:fillRef>
+          <a:effectRef idx="0">
+            <a:schemeClr val="accent1"/>
+          </a:effectRef>
+          <a:fontRef idx="minor">
+            <a:schemeClr val="tx1"/>
+          </a:fontRef>
+        </p:style>
+      </p:cxnSp>
+      <p:sp>
+        <p:nvSpPr>
+          <p:cNvPr id="23" name="TextBox 22">
+            <a:extLst>
+              <a:ext uri="{FF2B5EF4-FFF2-40B4-BE49-F238E27FC236}">
+                <a16:creationId xmlns:a16="http://schemas.microsoft.com/office/drawing/2014/main" id="{584392E4-0819-406B-AA3F-9C793867DAFD}"/>
+              </a:ext>
+            </a:extLst>
+          </p:cNvPr>
+          <p:cNvSpPr txBox="1"/>
+          <p:nvPr/>
+        </p:nvSpPr>
+        <p:spPr>
+          <a:xfrm>
+            <a:off x="5408863" y="1384033"/>
+            <a:ext cx="3271795" cy="830997"/>
+          </a:xfrm>
+          <a:prstGeom prst="rect">
+            <a:avLst/>
+          </a:prstGeom>
+          <a:noFill/>
+        </p:spPr>
+        <p:txBody>
+          <a:bodyPr wrap="square" rtlCol="0">
+            <a:spAutoFit/>
+          </a:bodyPr>
+          <a:lstStyle/>
+          <a:p>
+            <a:pPr>
+              <a:spcAft>
+                <a:spcPts val="600"/>
+              </a:spcAft>
+            </a:pPr>
+            <a:r>
+              <a:rPr lang="en-US" sz="1200" dirty="0" err="1">
+                <a:solidFill>
+                  <a:srgbClr val="FF0000"/>
+                </a:solidFill>
+                <a:ea typeface="Verdana" pitchFamily="34" charset="0"/>
+                <a:cs typeface="Verdana" pitchFamily="34" charset="0"/>
+              </a:rPr>
+              <a:t>Refsource</a:t>
+            </a:r>
+            <a:r>
+              <a:rPr lang="en-US" sz="1200" dirty="0">
+                <a:solidFill>
+                  <a:srgbClr val="FF0000"/>
+                </a:solidFill>
+                <a:ea typeface="Verdana" pitchFamily="34" charset="0"/>
+                <a:cs typeface="Verdana" pitchFamily="34" charset="0"/>
+              </a:rPr>
+              <a:t>  and name aren’t required by the standard.  However, </a:t>
+            </a:r>
+            <a:r>
+              <a:rPr lang="en-US" sz="1200" dirty="0" err="1">
+                <a:solidFill>
+                  <a:srgbClr val="FF0000"/>
+                </a:solidFill>
+                <a:ea typeface="Verdana" pitchFamily="34" charset="0"/>
+                <a:cs typeface="Verdana" pitchFamily="34" charset="0"/>
+              </a:rPr>
+              <a:t>Vulnogram</a:t>
+            </a:r>
+            <a:r>
+              <a:rPr lang="en-US" sz="1200" dirty="0">
+                <a:solidFill>
+                  <a:srgbClr val="FF0000"/>
+                </a:solidFill>
+                <a:ea typeface="Verdana" pitchFamily="34" charset="0"/>
+                <a:cs typeface="Verdana" pitchFamily="34" charset="0"/>
+              </a:rPr>
+              <a:t> requires the </a:t>
+            </a:r>
+            <a:r>
+              <a:rPr lang="en-US" sz="1200" dirty="0" err="1">
+                <a:solidFill>
+                  <a:srgbClr val="FF0000"/>
+                </a:solidFill>
+                <a:ea typeface="Verdana" pitchFamily="34" charset="0"/>
+                <a:cs typeface="Verdana" pitchFamily="34" charset="0"/>
+              </a:rPr>
+              <a:t>refsource</a:t>
+            </a:r>
+            <a:r>
+              <a:rPr lang="en-US" sz="1200" dirty="0">
+                <a:solidFill>
+                  <a:srgbClr val="FF0000"/>
+                </a:solidFill>
+                <a:ea typeface="Verdana" pitchFamily="34" charset="0"/>
+                <a:cs typeface="Verdana" pitchFamily="34" charset="0"/>
+              </a:rPr>
+              <a:t> and if you use </a:t>
+            </a:r>
+            <a:r>
+              <a:rPr lang="en-US" sz="1200" dirty="0" err="1">
+                <a:solidFill>
+                  <a:srgbClr val="FF0000"/>
+                </a:solidFill>
+                <a:ea typeface="Verdana" pitchFamily="34" charset="0"/>
+                <a:cs typeface="Verdana" pitchFamily="34" charset="0"/>
+              </a:rPr>
+              <a:t>refsource</a:t>
+            </a:r>
+            <a:r>
+              <a:rPr lang="en-US" sz="1200" dirty="0">
+                <a:solidFill>
+                  <a:srgbClr val="FF0000"/>
+                </a:solidFill>
+                <a:ea typeface="Verdana" pitchFamily="34" charset="0"/>
+                <a:cs typeface="Verdana" pitchFamily="34" charset="0"/>
+              </a:rPr>
+              <a:t>, you have to a name.</a:t>
+            </a:r>
+          </a:p>
+        </p:txBody>
+      </p:sp>
     </p:spTree>
     <p:extLst>
       <p:ext uri="{BB962C8B-B14F-4D97-AF65-F5344CB8AC3E}">
@@ -12507,6 +12971,170 @@
           </a:p>
         </p:txBody>
       </p:sp>
+      <p:sp>
+        <p:nvSpPr>
+          <p:cNvPr id="6" name="Rectangle: Rounded Corners 5">
+            <a:extLst>
+              <a:ext uri="{FF2B5EF4-FFF2-40B4-BE49-F238E27FC236}">
+                <a16:creationId xmlns:a16="http://schemas.microsoft.com/office/drawing/2014/main" id="{1F5C5BF4-B7AD-499F-A4DB-86ED9754D5C1}"/>
+              </a:ext>
+            </a:extLst>
+          </p:cNvPr>
+          <p:cNvSpPr/>
+          <p:nvPr/>
+        </p:nvSpPr>
+        <p:spPr>
+          <a:xfrm>
+            <a:off x="768892" y="4117139"/>
+            <a:ext cx="4386768" cy="785601"/>
+          </a:xfrm>
+          <a:prstGeom prst="roundRect">
+            <a:avLst/>
+          </a:prstGeom>
+          <a:noFill/>
+          <a:ln>
+            <a:solidFill>
+              <a:srgbClr val="FF0000"/>
+            </a:solidFill>
+          </a:ln>
+        </p:spPr>
+        <p:style>
+          <a:lnRef idx="2">
+            <a:schemeClr val="accent5"/>
+          </a:lnRef>
+          <a:fillRef idx="1">
+            <a:schemeClr val="lt1"/>
+          </a:fillRef>
+          <a:effectRef idx="0">
+            <a:schemeClr val="accent5"/>
+          </a:effectRef>
+          <a:fontRef idx="minor">
+            <a:schemeClr val="dk1"/>
+          </a:fontRef>
+        </p:style>
+        <p:txBody>
+          <a:bodyPr rtlCol="0" anchor="ctr"/>
+          <a:lstStyle/>
+          <a:p>
+            <a:pPr algn="ctr"/>
+            <a:endParaRPr lang="en-US">
+              <a:solidFill>
+                <a:schemeClr val="tx1"/>
+              </a:solidFill>
+            </a:endParaRPr>
+          </a:p>
+        </p:txBody>
+      </p:sp>
+      <p:sp>
+        <p:nvSpPr>
+          <p:cNvPr id="7" name="TextBox 6">
+            <a:extLst>
+              <a:ext uri="{FF2B5EF4-FFF2-40B4-BE49-F238E27FC236}">
+                <a16:creationId xmlns:a16="http://schemas.microsoft.com/office/drawing/2014/main" id="{1EE9B62E-41BA-447B-8CF6-E1FD956C0E75}"/>
+              </a:ext>
+            </a:extLst>
+          </p:cNvPr>
+          <p:cNvSpPr txBox="1"/>
+          <p:nvPr/>
+        </p:nvSpPr>
+        <p:spPr>
+          <a:xfrm>
+            <a:off x="5658990" y="3604859"/>
+            <a:ext cx="2463606" cy="646331"/>
+          </a:xfrm>
+          <a:prstGeom prst="rect">
+            <a:avLst/>
+          </a:prstGeom>
+          <a:noFill/>
+        </p:spPr>
+        <p:txBody>
+          <a:bodyPr wrap="square" rtlCol="0">
+            <a:spAutoFit/>
+          </a:bodyPr>
+          <a:lstStyle/>
+          <a:p>
+            <a:pPr>
+              <a:spcAft>
+                <a:spcPts val="600"/>
+              </a:spcAft>
+            </a:pPr>
+            <a:r>
+              <a:rPr lang="en-US" sz="1200" dirty="0">
+                <a:solidFill>
+                  <a:srgbClr val="FF0000"/>
+                </a:solidFill>
+                <a:ea typeface="Verdana" pitchFamily="34" charset="0"/>
+                <a:cs typeface="Verdana" pitchFamily="34" charset="0"/>
+              </a:rPr>
+              <a:t>Must be moved to the top box for </a:t>
+            </a:r>
+            <a:r>
+              <a:rPr lang="en-US" sz="1200" dirty="0" err="1">
+                <a:solidFill>
+                  <a:srgbClr val="FF0000"/>
+                </a:solidFill>
+                <a:ea typeface="Verdana" pitchFamily="34" charset="0"/>
+                <a:cs typeface="Verdana" pitchFamily="34" charset="0"/>
+              </a:rPr>
+              <a:t>Vulnogram</a:t>
+            </a:r>
+            <a:r>
+              <a:rPr lang="en-US" sz="1200" dirty="0">
+                <a:solidFill>
+                  <a:srgbClr val="FF0000"/>
+                </a:solidFill>
+                <a:ea typeface="Verdana" pitchFamily="34" charset="0"/>
+                <a:cs typeface="Verdana" pitchFamily="34" charset="0"/>
+              </a:rPr>
+              <a:t> to generate proper JSON</a:t>
+            </a:r>
+          </a:p>
+        </p:txBody>
+      </p:sp>
+      <p:cxnSp>
+        <p:nvCxnSpPr>
+          <p:cNvPr id="8" name="Straight Arrow Connector 7">
+            <a:extLst>
+              <a:ext uri="{FF2B5EF4-FFF2-40B4-BE49-F238E27FC236}">
+                <a16:creationId xmlns:a16="http://schemas.microsoft.com/office/drawing/2014/main" id="{DF7E9400-3702-419B-9900-E7C913F0D2CC}"/>
+              </a:ext>
+            </a:extLst>
+          </p:cNvPr>
+          <p:cNvCxnSpPr>
+            <a:stCxn id="7" idx="1"/>
+          </p:cNvCxnSpPr>
+          <p:nvPr/>
+        </p:nvCxnSpPr>
+        <p:spPr>
+          <a:xfrm flipH="1">
+            <a:off x="5155660" y="3928025"/>
+            <a:ext cx="503330" cy="566154"/>
+          </a:xfrm>
+          <a:prstGeom prst="straightConnector1">
+            <a:avLst/>
+          </a:prstGeom>
+          <a:ln>
+            <a:solidFill>
+              <a:schemeClr val="tx1"/>
+            </a:solidFill>
+            <a:tailEnd type="triangle"/>
+          </a:ln>
+        </p:spPr>
+        <p:style>
+          <a:lnRef idx="1">
+            <a:schemeClr val="accent1"/>
+          </a:lnRef>
+          <a:fillRef idx="0">
+            <a:schemeClr val="accent1"/>
+          </a:fillRef>
+          <a:effectRef idx="0">
+            <a:schemeClr val="accent1"/>
+          </a:effectRef>
+          <a:fontRef idx="minor">
+            <a:schemeClr val="tx1"/>
+          </a:fontRef>
+        </p:style>
+      </p:cxnSp>
     </p:spTree>
     <p:extLst>
       <p:ext uri="{BB962C8B-B14F-4D97-AF65-F5344CB8AC3E}">
@@ -12667,6 +13295,106 @@
           </a:prstGeom>
         </p:spPr>
       </p:pic>
+      <p:sp>
+        <p:nvSpPr>
+          <p:cNvPr id="5" name="Rectangle: Rounded Corners 4">
+            <a:extLst>
+              <a:ext uri="{FF2B5EF4-FFF2-40B4-BE49-F238E27FC236}">
+                <a16:creationId xmlns:a16="http://schemas.microsoft.com/office/drawing/2014/main" id="{C3E4E9A5-0B0D-48A2-A914-CB5F86A4CCF1}"/>
+              </a:ext>
+            </a:extLst>
+          </p:cNvPr>
+          <p:cNvSpPr/>
+          <p:nvPr/>
+        </p:nvSpPr>
+        <p:spPr>
+          <a:xfrm>
+            <a:off x="759164" y="2947481"/>
+            <a:ext cx="7013235" cy="272374"/>
+          </a:xfrm>
+          <a:prstGeom prst="roundRect">
+            <a:avLst/>
+          </a:prstGeom>
+          <a:noFill/>
+          <a:ln>
+            <a:solidFill>
+              <a:srgbClr val="FF0000"/>
+            </a:solidFill>
+          </a:ln>
+        </p:spPr>
+        <p:style>
+          <a:lnRef idx="2">
+            <a:schemeClr val="accent5"/>
+          </a:lnRef>
+          <a:fillRef idx="1">
+            <a:schemeClr val="lt1"/>
+          </a:fillRef>
+          <a:effectRef idx="0">
+            <a:schemeClr val="accent5"/>
+          </a:effectRef>
+          <a:fontRef idx="minor">
+            <a:schemeClr val="dk1"/>
+          </a:fontRef>
+        </p:style>
+        <p:txBody>
+          <a:bodyPr rtlCol="0" anchor="ctr"/>
+          <a:lstStyle/>
+          <a:p>
+            <a:pPr algn="ctr"/>
+            <a:endParaRPr lang="en-US">
+              <a:solidFill>
+                <a:schemeClr val="tx1"/>
+              </a:solidFill>
+            </a:endParaRPr>
+          </a:p>
+        </p:txBody>
+      </p:sp>
+      <p:sp>
+        <p:nvSpPr>
+          <p:cNvPr id="6" name="TextBox 5">
+            <a:extLst>
+              <a:ext uri="{FF2B5EF4-FFF2-40B4-BE49-F238E27FC236}">
+                <a16:creationId xmlns:a16="http://schemas.microsoft.com/office/drawing/2014/main" id="{FB7E4761-5D6D-40E4-9501-6BFD8972D71F}"/>
+              </a:ext>
+            </a:extLst>
+          </p:cNvPr>
+          <p:cNvSpPr txBox="1"/>
+          <p:nvPr/>
+        </p:nvSpPr>
+        <p:spPr>
+          <a:xfrm>
+            <a:off x="5408863" y="1384033"/>
+            <a:ext cx="3271795" cy="830997"/>
+          </a:xfrm>
+          <a:prstGeom prst="rect">
+            <a:avLst/>
+          </a:prstGeom>
+          <a:noFill/>
+        </p:spPr>
+        <p:txBody>
+          <a:bodyPr wrap="square" rtlCol="0">
+            <a:spAutoFit/>
+          </a:bodyPr>
+          <a:lstStyle/>
+          <a:p>
+            <a:pPr>
+              <a:spcAft>
+                <a:spcPts val="600"/>
+              </a:spcAft>
+            </a:pPr>
+            <a:r>
+              <a:rPr lang="en-US" sz="1200" dirty="0">
+                <a:solidFill>
+                  <a:srgbClr val="FF0000"/>
+                </a:solidFill>
+                <a:ea typeface="Verdana" pitchFamily="34" charset="0"/>
+                <a:cs typeface="Verdana" pitchFamily="34" charset="0"/>
+              </a:rPr>
+              <a:t>Product, version, and problem type information must be in the description section.  There are no restrictions on how they are phrased in the description section.</a:t>
+            </a:r>
+          </a:p>
+        </p:txBody>
+      </p:sp>
     </p:spTree>
     <p:extLst>
       <p:ext uri="{BB962C8B-B14F-4D97-AF65-F5344CB8AC3E}">
@@ -13340,7 +14068,7 @@
         <p:spPr/>
         <p:txBody>
           <a:bodyPr>
-            <a:normAutofit/>
+            <a:normAutofit lnSpcReduction="10000"/>
           </a:bodyPr>
           <a:lstStyle/>
           <a:p>
@@ -13411,6 +14139,12 @@
               <a:buNone/>
             </a:pPr>
             <a:endParaRPr lang="en-US" dirty="0"/>
+          </a:p>
+          <a:p>
+            <a:r>
+              <a:rPr lang="en-US" dirty="0"/>
+              <a:t>On CVE ID per [CVEID] field.</a:t>
+            </a:r>
           </a:p>
           <a:p>
             <a:r>

</xml_diff>